<commit_message>
ted_scrap: downloading transcripts with time
</commit_message>
<xml_diff>
--- a/ZeroSpeech_architecture.pptx
+++ b/ZeroSpeech_architecture.pptx
@@ -111,18 +111,7 @@
   </p:defaultTextStyle>
   <p:extLst>
     <p:ext uri="{EFAFB233-063F-42B5-8137-9DF3F51BA10A}">
-      <p15:sldGuideLst xmlns:p15="http://schemas.microsoft.com/office/powerpoint/2012/main">
-        <p15:guide id="1" orient="horz" pos="2160" userDrawn="1">
-          <p15:clr>
-            <a:srgbClr val="A4A3A4"/>
-          </p15:clr>
-        </p15:guide>
-        <p15:guide id="2" pos="3840" userDrawn="1">
-          <p15:clr>
-            <a:srgbClr val="A4A3A4"/>
-          </p15:clr>
-        </p15:guide>
-      </p15:sldGuideLst>
+      <p15:sldGuideLst xmlns:p15="http://schemas.microsoft.com/office/powerpoint/2012/main"/>
     </p:ext>
   </p:extLst>
 </p:presentation>
@@ -9194,8 +9183,8 @@
         </p:nvSpPr>
         <p:spPr>
           <a:xfrm rot="15511536" flipV="1">
-            <a:off x="245610" y="2022169"/>
-            <a:ext cx="2920655" cy="1496508"/>
+            <a:off x="312403" y="1940454"/>
+            <a:ext cx="2920655" cy="1632821"/>
           </a:xfrm>
           <a:prstGeom prst="arc">
             <a:avLst>
@@ -15637,9 +15626,12 @@
 </file>
 
 <file path=customXml/item1.xml><?xml version="1.0" encoding="utf-8"?>
-<p:properties xmlns:p="http://schemas.microsoft.com/office/2006/metadata/properties" xmlns:xsi="http://www.w3.org/2001/XMLSchema-instance" xmlns:pc="http://schemas.microsoft.com/office/infopath/2007/PartnerControls">
-  <documentManagement/>
-</p:properties>
+<?mso-contentType ?>
+<FormTemplates xmlns="http://schemas.microsoft.com/sharepoint/v3/contenttype/forms">
+  <Display>DocumentLibraryForm</Display>
+  <Edit>DocumentLibraryForm</Edit>
+  <New>DocumentLibraryForm</New>
+</FormTemplates>
 </file>
 
 <file path=customXml/item2.xml><?xml version="1.0" encoding="utf-8"?>
@@ -15775,26 +15767,15 @@
 </file>
 
 <file path=customXml/item3.xml><?xml version="1.0" encoding="utf-8"?>
-<?mso-contentType ?>
-<FormTemplates xmlns="http://schemas.microsoft.com/sharepoint/v3/contenttype/forms">
-  <Display>DocumentLibraryForm</Display>
-  <Edit>DocumentLibraryForm</Edit>
-  <New>DocumentLibraryForm</New>
-</FormTemplates>
+<p:properties xmlns:p="http://schemas.microsoft.com/office/2006/metadata/properties" xmlns:xsi="http://www.w3.org/2001/XMLSchema-instance" xmlns:pc="http://schemas.microsoft.com/office/infopath/2007/PartnerControls">
+  <documentManagement/>
+</p:properties>
 </file>
 
 <file path=customXml/itemProps1.xml><?xml version="1.0" encoding="utf-8"?>
-<ds:datastoreItem xmlns:ds="http://schemas.openxmlformats.org/officeDocument/2006/customXml" ds:itemID="{176998FF-515E-4A3B-A360-5762139F3229}">
+<ds:datastoreItem xmlns:ds="http://schemas.openxmlformats.org/officeDocument/2006/customXml" ds:itemID="{725DFE51-6B55-4197-B3F7-7AA4DC81728E}">
   <ds:schemaRefs>
-    <ds:schemaRef ds:uri="http://schemas.microsoft.com/office/2006/documentManagement/types"/>
-    <ds:schemaRef ds:uri="4b39ba4e-6da4-4f68-ae85-0f120f20dc89"/>
-    <ds:schemaRef ds:uri="http://purl.org/dc/elements/1.1/"/>
-    <ds:schemaRef ds:uri="http://www.w3.org/XML/1998/namespace"/>
-    <ds:schemaRef ds:uri="http://schemas.microsoft.com/office/2006/metadata/properties"/>
-    <ds:schemaRef ds:uri="http://schemas.microsoft.com/office/infopath/2007/PartnerControls"/>
-    <ds:schemaRef ds:uri="http://purl.org/dc/terms/"/>
-    <ds:schemaRef ds:uri="http://schemas.openxmlformats.org/package/2006/metadata/core-properties"/>
-    <ds:schemaRef ds:uri="http://purl.org/dc/dcmitype/"/>
+    <ds:schemaRef ds:uri="http://schemas.microsoft.com/sharepoint/v3/contenttype/forms"/>
   </ds:schemaRefs>
 </ds:datastoreItem>
 </file>
@@ -15818,9 +15799,17 @@
 </file>
 
 <file path=customXml/itemProps3.xml><?xml version="1.0" encoding="utf-8"?>
-<ds:datastoreItem xmlns:ds="http://schemas.openxmlformats.org/officeDocument/2006/customXml" ds:itemID="{725DFE51-6B55-4197-B3F7-7AA4DC81728E}">
+<ds:datastoreItem xmlns:ds="http://schemas.openxmlformats.org/officeDocument/2006/customXml" ds:itemID="{176998FF-515E-4A3B-A360-5762139F3229}">
   <ds:schemaRefs>
-    <ds:schemaRef ds:uri="http://schemas.microsoft.com/sharepoint/v3/contenttype/forms"/>
+    <ds:schemaRef ds:uri="http://schemas.microsoft.com/office/2006/documentManagement/types"/>
+    <ds:schemaRef ds:uri="4b39ba4e-6da4-4f68-ae85-0f120f20dc89"/>
+    <ds:schemaRef ds:uri="http://purl.org/dc/elements/1.1/"/>
+    <ds:schemaRef ds:uri="http://www.w3.org/XML/1998/namespace"/>
+    <ds:schemaRef ds:uri="http://schemas.microsoft.com/office/2006/metadata/properties"/>
+    <ds:schemaRef ds:uri="http://schemas.microsoft.com/office/infopath/2007/PartnerControls"/>
+    <ds:schemaRef ds:uri="http://purl.org/dc/terms/"/>
+    <ds:schemaRef ds:uri="http://schemas.openxmlformats.org/package/2006/metadata/core-properties"/>
+    <ds:schemaRef ds:uri="http://purl.org/dc/dcmitype/"/>
   </ds:schemaRefs>
 </ds:datastoreItem>
 </file>
</xml_diff>